<commit_message>
modified 04Brian2-2.pptx, 세미나 전 ppt 최종 수정
</commit_message>
<xml_diff>
--- a/cs semina/04Brian2-2.pptx
+++ b/cs semina/04Brian2-2.pptx
@@ -289,7 +289,7 @@
           <a:p>
             <a:fld id="{57764B8E-7EC0-4B59-8DA5-E04CAE3DB5F2}" type="datetimeFigureOut">
               <a:rPr lang="ko-KR" altLang="en-US" smtClean="0"/>
-              <a:t>2024-01-27</a:t>
+              <a:t>2024-01-29</a:t>
             </a:fld>
             <a:endParaRPr lang="ko-KR" altLang="en-US"/>
           </a:p>
@@ -602,8 +602,139 @@
           <a:p>
             <a:r>
               <a:rPr lang="ko-KR" altLang="en-US" dirty="0"/>
-              <a:t>목차</a:t>
-            </a:r>
+              <a:t>이번 세미나에서는 저번 세미나에 이어서 </a:t>
+            </a:r>
+            <a:r>
+              <a:rPr lang="ko-KR" altLang="en-US" dirty="0" err="1"/>
+              <a:t>브라이언투의</a:t>
+            </a:r>
+            <a:r>
+              <a:rPr lang="ko-KR" altLang="en-US" dirty="0"/>
+              <a:t> 튜토리얼 두번째 내용을 준비했습니다</a:t>
+            </a:r>
+            <a:r>
+              <a:rPr lang="en-US" altLang="ko-KR" dirty="0"/>
+              <a:t>.</a:t>
+            </a:r>
+            <a:endParaRPr lang="ko-KR" altLang="en-US" dirty="0"/>
+          </a:p>
+        </p:txBody>
+      </p:sp>
+      <p:sp>
+        <p:nvSpPr>
+          <p:cNvPr id="4" name="슬라이드 번호 개체 틀 3"/>
+          <p:cNvSpPr>
+            <a:spLocks noGrp="1"/>
+          </p:cNvSpPr>
+          <p:nvPr>
+            <p:ph type="sldNum" sz="quarter" idx="5"/>
+          </p:nvPr>
+        </p:nvSpPr>
+        <p:spPr/>
+        <p:txBody>
+          <a:bodyPr/>
+          <a:lstStyle/>
+          <a:p>
+            <a:fld id="{420F09F9-D812-4758-8566-A65BCCCBDD8F}" type="slidenum">
+              <a:rPr lang="ko-KR" altLang="en-US" smtClean="0"/>
+              <a:t>1</a:t>
+            </a:fld>
+            <a:endParaRPr lang="ko-KR" altLang="en-US"/>
+          </a:p>
+        </p:txBody>
+      </p:sp>
+    </p:spTree>
+    <p:extLst>
+      <p:ext uri="{BB962C8B-B14F-4D97-AF65-F5344CB8AC3E}">
+        <p14:creationId xmlns:p14="http://schemas.microsoft.com/office/powerpoint/2010/main" val="293501044"/>
+      </p:ext>
+    </p:extLst>
+  </p:cSld>
+  <p:clrMapOvr>
+    <a:masterClrMapping/>
+  </p:clrMapOvr>
+</p:notes>
+</file>
+
+<file path=ppt/notesSlides/notesSlide2.xml><?xml version="1.0" encoding="utf-8"?>
+<p:notes xmlns:a="http://schemas.openxmlformats.org/drawingml/2006/main" xmlns:r="http://schemas.openxmlformats.org/officeDocument/2006/relationships" xmlns:p="http://schemas.openxmlformats.org/presentationml/2006/main">
+  <p:cSld>
+    <p:spTree>
+      <p:nvGrpSpPr>
+        <p:cNvPr id="1" name=""/>
+        <p:cNvGrpSpPr/>
+        <p:nvPr/>
+      </p:nvGrpSpPr>
+      <p:grpSpPr>
+        <a:xfrm>
+          <a:off x="0" y="0"/>
+          <a:ext cx="0" cy="0"/>
+          <a:chOff x="0" y="0"/>
+          <a:chExt cx="0" cy="0"/>
+        </a:xfrm>
+      </p:grpSpPr>
+      <p:sp>
+        <p:nvSpPr>
+          <p:cNvPr id="2" name="슬라이드 이미지 개체 틀 1"/>
+          <p:cNvSpPr>
+            <a:spLocks noGrp="1" noRot="1" noChangeAspect="1"/>
+          </p:cNvSpPr>
+          <p:nvPr>
+            <p:ph type="sldImg"/>
+          </p:nvPr>
+        </p:nvSpPr>
+        <p:spPr/>
+      </p:sp>
+      <p:sp>
+        <p:nvSpPr>
+          <p:cNvPr id="3" name="슬라이드 노트 개체 틀 2"/>
+          <p:cNvSpPr>
+            <a:spLocks noGrp="1"/>
+          </p:cNvSpPr>
+          <p:nvPr>
+            <p:ph type="body" idx="1"/>
+          </p:nvPr>
+        </p:nvSpPr>
+        <p:spPr/>
+        <p:txBody>
+          <a:bodyPr/>
+          <a:lstStyle/>
+          <a:p>
+            <a:r>
+              <a:rPr lang="ko-KR" altLang="en-US" dirty="0"/>
+              <a:t>목차는 다음과 같이 저번 세미나때 잘못 이해한 내화성에 대해 간단히 짚고</a:t>
+            </a:r>
+            <a:r>
+              <a:rPr lang="en-US" altLang="ko-KR" dirty="0"/>
+              <a:t>,</a:t>
+            </a:r>
+          </a:p>
+          <a:p>
+            <a:r>
+              <a:rPr lang="ko-KR" altLang="en-US" dirty="0"/>
+              <a:t>다중 뉴런 생성</a:t>
+            </a:r>
+            <a:r>
+              <a:rPr lang="en-US" altLang="ko-KR" dirty="0"/>
+              <a:t>, </a:t>
+            </a:r>
+            <a:r>
+              <a:rPr lang="ko-KR" altLang="en-US" dirty="0"/>
+              <a:t>다중 뉴런의 시냅스 연결</a:t>
+            </a:r>
+            <a:r>
+              <a:rPr lang="en-US" altLang="ko-KR" dirty="0"/>
+              <a:t>, </a:t>
+            </a:r>
+            <a:r>
+              <a:rPr lang="ko-KR" altLang="en-US" dirty="0"/>
+              <a:t>복잡한 시냅스 연결 내용을 준비했습니다</a:t>
+            </a:r>
+            <a:r>
+              <a:rPr lang="en-US" altLang="ko-KR" dirty="0"/>
+              <a:t>.</a:t>
+            </a:r>
+            <a:endParaRPr lang="ko-KR" altLang="en-US" dirty="0"/>
           </a:p>
         </p:txBody>
       </p:sp>
@@ -4555,6 +4686,70 @@
           </a:ln>
         </p:spPr>
       </p:pic>
+      <p:sp>
+        <p:nvSpPr>
+          <p:cNvPr id="4" name="직사각형 3">
+            <a:extLst>
+              <a:ext uri="{FF2B5EF4-FFF2-40B4-BE49-F238E27FC236}">
+                <a16:creationId xmlns:a16="http://schemas.microsoft.com/office/drawing/2014/main" id="{B76EED87-2805-BEDD-585D-D7469BAEFCD0}"/>
+              </a:ext>
+            </a:extLst>
+          </p:cNvPr>
+          <p:cNvSpPr/>
+          <p:nvPr/>
+        </p:nvSpPr>
+        <p:spPr>
+          <a:xfrm>
+            <a:off x="828675" y="4437112"/>
+            <a:ext cx="2375173" cy="360040"/>
+          </a:xfrm>
+          <a:prstGeom prst="rect">
+            <a:avLst/>
+          </a:prstGeom>
+          <a:noFill/>
+          <a:ln w="28575" cap="flat" cmpd="sng" algn="ctr">
+            <a:solidFill>
+              <a:srgbClr val="FF0000"/>
+            </a:solidFill>
+            <a:prstDash val="solid"/>
+            <a:round/>
+          </a:ln>
+          <a:effectLst/>
+        </p:spPr>
+        <p:txBody>
+          <a:bodyPr vert="horz" wrap="square" lIns="91440" tIns="45720" rIns="91440" bIns="45720" numCol="1" rtlCol="0" anchor="ctr" anchorCtr="0" compatLnSpc="1">
+            <a:prstTxWarp prst="textNoShape">
+              <a:avLst/>
+            </a:prstTxWarp>
+            <a:spAutoFit/>
+          </a:bodyPr>
+          <a:lstStyle/>
+          <a:p>
+            <a:pPr marL="0" marR="0" indent="0" algn="ctr" defTabSz="914400" rtl="0" eaLnBrk="1" fontAlgn="base" latinLnBrk="1" hangingPunct="1">
+              <a:lnSpc>
+                <a:spcPct val="100000"/>
+              </a:lnSpc>
+              <a:spcBef>
+                <a:spcPct val="0"/>
+              </a:spcBef>
+              <a:spcAft>
+                <a:spcPct val="0"/>
+              </a:spcAft>
+              <a:buNone/>
+            </a:pPr>
+            <a:endParaRPr kumimoji="1" lang="ko-KR" altLang="en-US" sz="2400" b="0" i="0" u="none" strike="noStrike" cap="none" normalizeH="0" baseline="0">
+              <a:ln>
+                <a:noFill/>
+              </a:ln>
+              <a:solidFill>
+                <a:schemeClr val="tx1"/>
+              </a:solidFill>
+              <a:latin typeface="Times New Roman"/>
+              <a:ea typeface="굴림"/>
+            </a:endParaRPr>
+          </a:p>
+        </p:txBody>
+      </p:sp>
     </p:spTree>
     <p:extLst>
       <p:ext uri="{BB962C8B-B14F-4D97-AF65-F5344CB8AC3E}">
@@ -5031,6 +5226,70 @@
           <a:xfrm>
             <a:off x="828674" y="3179420"/>
             <a:ext cx="4823445" cy="707886"/>
+          </a:xfrm>
+          <a:prstGeom prst="rect">
+            <a:avLst/>
+          </a:prstGeom>
+          <a:noFill/>
+          <a:ln w="28575" cap="flat" cmpd="sng" algn="ctr">
+            <a:solidFill>
+              <a:srgbClr val="FF0000"/>
+            </a:solidFill>
+            <a:prstDash val="solid"/>
+            <a:round/>
+          </a:ln>
+          <a:effectLst/>
+        </p:spPr>
+        <p:txBody>
+          <a:bodyPr vert="horz" wrap="square" lIns="91440" tIns="45720" rIns="91440" bIns="45720" numCol="1" rtlCol="0" anchor="ctr" anchorCtr="0" compatLnSpc="1">
+            <a:prstTxWarp prst="textNoShape">
+              <a:avLst/>
+            </a:prstTxWarp>
+            <a:spAutoFit/>
+          </a:bodyPr>
+          <a:lstStyle/>
+          <a:p>
+            <a:pPr marL="0" marR="0" indent="0" algn="ctr" defTabSz="914400" rtl="0" eaLnBrk="1" fontAlgn="base" latinLnBrk="1" hangingPunct="1">
+              <a:lnSpc>
+                <a:spcPct val="100000"/>
+              </a:lnSpc>
+              <a:spcBef>
+                <a:spcPct val="0"/>
+              </a:spcBef>
+              <a:spcAft>
+                <a:spcPct val="0"/>
+              </a:spcAft>
+              <a:buNone/>
+            </a:pPr>
+            <a:endParaRPr kumimoji="1" lang="ko-KR" altLang="en-US" sz="2400" b="0" i="0" u="none" strike="noStrike" cap="none" normalizeH="0" baseline="0">
+              <a:ln>
+                <a:noFill/>
+              </a:ln>
+              <a:solidFill>
+                <a:schemeClr val="tx1"/>
+              </a:solidFill>
+              <a:latin typeface="Times New Roman"/>
+              <a:ea typeface="굴림"/>
+            </a:endParaRPr>
+          </a:p>
+        </p:txBody>
+      </p:sp>
+      <p:sp>
+        <p:nvSpPr>
+          <p:cNvPr id="4" name="직사각형 3">
+            <a:extLst>
+              <a:ext uri="{FF2B5EF4-FFF2-40B4-BE49-F238E27FC236}">
+                <a16:creationId xmlns:a16="http://schemas.microsoft.com/office/drawing/2014/main" id="{836E195A-F3F6-5D81-47BA-4D7B30BA1F94}"/>
+              </a:ext>
+            </a:extLst>
+          </p:cNvPr>
+          <p:cNvSpPr/>
+          <p:nvPr/>
+        </p:nvSpPr>
+        <p:spPr>
+          <a:xfrm>
+            <a:off x="828674" y="4010588"/>
+            <a:ext cx="5458871" cy="707886"/>
           </a:xfrm>
           <a:prstGeom prst="rect">
             <a:avLst/>
@@ -7234,7 +7493,9 @@
         </p:nvSpPr>
         <p:spPr/>
         <p:txBody>
-          <a:bodyPr/>
+          <a:bodyPr>
+            <a:normAutofit/>
+          </a:bodyPr>
           <a:lstStyle/>
           <a:p>
             <a:r>
@@ -7282,19 +7543,28 @@
             <a:br>
               <a:rPr lang="en-US" altLang="ko-KR" sz="2400" dirty="0"/>
             </a:br>
-            <a:endParaRPr lang="en-US" altLang="ko-KR" sz="2400" dirty="0"/>
-          </a:p>
-          <a:p>
-            <a:r>
-              <a:rPr lang="en-US" altLang="ko-KR" sz="2400" dirty="0"/>
-              <a:t>Brian2 Tutorial</a:t>
+            <a:r>
+              <a:rPr lang="en-US" altLang="ko-KR" sz="2400" dirty="0">
+                <a:hlinkClick r:id="rId3"/>
+              </a:rPr>
+              <a:t>https://github.com/DevelopLee20/SNN/blob/master/notes/4-Brian2-2.md</a:t>
             </a:r>
             <a:br>
               <a:rPr lang="en-US" altLang="ko-KR" sz="2400" dirty="0"/>
             </a:br>
+            <a:endParaRPr lang="en-US" altLang="ko-KR" sz="2400" dirty="0"/>
+          </a:p>
+          <a:p>
+            <a:r>
+              <a:rPr lang="en-US" altLang="ko-KR" sz="2400" dirty="0"/>
+              <a:t>Brian2 Tutorial</a:t>
+            </a:r>
+            <a:br>
+              <a:rPr lang="en-US" altLang="ko-KR" sz="2400" dirty="0"/>
+            </a:br>
             <a:r>
               <a:rPr lang="en-US" altLang="ko-KR" sz="2400" dirty="0">
-                <a:hlinkClick r:id="rId3"/>
+                <a:hlinkClick r:id="rId4"/>
               </a:rPr>
               <a:t>https://brian2.readthedocs.io/en/stable/resources/tutorials/2-intro-to-brian-synapses.html</a:t>
             </a:r>

</xml_diff>